<commit_message>
added references & final PPT updates
</commit_message>
<xml_diff>
--- a/projectFiles/Heart Disease ML Project Presentation.pptx
+++ b/projectFiles/Heart Disease ML Project Presentation.pptx
@@ -5,7 +5,7 @@
     <p:sldMasterId id="2147483650" r:id="rId1"/>
   </p:sldMasterIdLst>
   <p:notesMasterIdLst>
-    <p:notesMasterId r:id="rId24"/>
+    <p:notesMasterId r:id="rId23"/>
   </p:notesMasterIdLst>
   <p:sldIdLst>
     <p:sldId id="256" r:id="rId2"/>
@@ -15,21 +15,20 @@
     <p:sldId id="260" r:id="rId6"/>
     <p:sldId id="261" r:id="rId7"/>
     <p:sldId id="262" r:id="rId8"/>
-    <p:sldId id="263" r:id="rId9"/>
-    <p:sldId id="264" r:id="rId10"/>
-    <p:sldId id="265" r:id="rId11"/>
-    <p:sldId id="266" r:id="rId12"/>
-    <p:sldId id="267" r:id="rId13"/>
-    <p:sldId id="269" r:id="rId14"/>
-    <p:sldId id="270" r:id="rId15"/>
-    <p:sldId id="271" r:id="rId16"/>
-    <p:sldId id="272" r:id="rId17"/>
-    <p:sldId id="273" r:id="rId18"/>
-    <p:sldId id="274" r:id="rId19"/>
-    <p:sldId id="275" r:id="rId20"/>
-    <p:sldId id="276" r:id="rId21"/>
-    <p:sldId id="277" r:id="rId22"/>
-    <p:sldId id="278" r:id="rId23"/>
+    <p:sldId id="264" r:id="rId9"/>
+    <p:sldId id="265" r:id="rId10"/>
+    <p:sldId id="266" r:id="rId11"/>
+    <p:sldId id="267" r:id="rId12"/>
+    <p:sldId id="269" r:id="rId13"/>
+    <p:sldId id="270" r:id="rId14"/>
+    <p:sldId id="271" r:id="rId15"/>
+    <p:sldId id="272" r:id="rId16"/>
+    <p:sldId id="273" r:id="rId17"/>
+    <p:sldId id="274" r:id="rId18"/>
+    <p:sldId id="275" r:id="rId19"/>
+    <p:sldId id="276" r:id="rId20"/>
+    <p:sldId id="277" r:id="rId21"/>
+    <p:sldId id="278" r:id="rId22"/>
   </p:sldIdLst>
   <p:sldSz cx="9144000" cy="5143500" type="screen16x9"/>
   <p:notesSz cx="6858000" cy="9144000"/>
@@ -831,7 +830,7 @@
   <p:cSld>
     <p:spTree>
       <p:nvGrpSpPr>
-        <p:cNvPr id="1" name="Shape 83"/>
+        <p:cNvPr id="1" name="Shape 90"/>
         <p:cNvGrpSpPr/>
         <p:nvPr/>
       </p:nvGrpSpPr>
@@ -845,7 +844,7 @@
       </p:grpSpPr>
       <p:sp>
         <p:nvSpPr>
-          <p:cNvPr id="84" name="Google Shape;84;gdfc1f552a7_3_12:notes"/>
+          <p:cNvPr id="91" name="Google Shape;91;ge053b3de7a_0_11:notes"/>
           <p:cNvSpPr>
             <a:spLocks noGrp="1" noRot="1" noChangeAspect="1"/>
           </p:cNvSpPr>
@@ -886,7 +885,7 @@
       </p:sp>
       <p:sp>
         <p:nvSpPr>
-          <p:cNvPr id="85" name="Google Shape;85;gdfc1f552a7_3_12:notes"/>
+          <p:cNvPr id="92" name="Google Shape;92;ge053b3de7a_0_11:notes"/>
           <p:cNvSpPr txBox="1">
             <a:spLocks noGrp="1"/>
           </p:cNvSpPr>
@@ -931,110 +930,6 @@
 </file>
 
 <file path=ppt/notesSlides/notesSlide11.xml><?xml version="1.0" encoding="utf-8"?>
-<p:notes xmlns:a="http://schemas.openxmlformats.org/drawingml/2006/main" xmlns:r="http://schemas.openxmlformats.org/officeDocument/2006/relationships" xmlns:p="http://schemas.openxmlformats.org/presentationml/2006/main" showMasterSp="0" showMasterPhAnim="0">
-  <p:cSld>
-    <p:spTree>
-      <p:nvGrpSpPr>
-        <p:cNvPr id="1" name="Shape 90"/>
-        <p:cNvGrpSpPr/>
-        <p:nvPr/>
-      </p:nvGrpSpPr>
-      <p:grpSpPr>
-        <a:xfrm>
-          <a:off x="0" y="0"/>
-          <a:ext cx="0" cy="0"/>
-          <a:chOff x="0" y="0"/>
-          <a:chExt cx="0" cy="0"/>
-        </a:xfrm>
-      </p:grpSpPr>
-      <p:sp>
-        <p:nvSpPr>
-          <p:cNvPr id="91" name="Google Shape;91;ge053b3de7a_0_11:notes"/>
-          <p:cNvSpPr>
-            <a:spLocks noGrp="1" noRot="1" noChangeAspect="1"/>
-          </p:cNvSpPr>
-          <p:nvPr>
-            <p:ph type="sldImg" idx="2"/>
-          </p:nvPr>
-        </p:nvSpPr>
-        <p:spPr>
-          <a:xfrm>
-            <a:off x="381300" y="685800"/>
-            <a:ext cx="6096000" cy="3429000"/>
-          </a:xfrm>
-          <a:custGeom>
-            <a:avLst/>
-            <a:gdLst/>
-            <a:ahLst/>
-            <a:cxnLst/>
-            <a:rect l="l" t="t" r="r" b="b"/>
-            <a:pathLst>
-              <a:path w="120000" h="120000" extrusionOk="0">
-                <a:moveTo>
-                  <a:pt x="0" y="0"/>
-                </a:moveTo>
-                <a:lnTo>
-                  <a:pt x="120000" y="0"/>
-                </a:lnTo>
-                <a:lnTo>
-                  <a:pt x="120000" y="120000"/>
-                </a:lnTo>
-                <a:lnTo>
-                  <a:pt x="0" y="120000"/>
-                </a:lnTo>
-                <a:close/>
-              </a:path>
-            </a:pathLst>
-          </a:custGeom>
-        </p:spPr>
-      </p:sp>
-      <p:sp>
-        <p:nvSpPr>
-          <p:cNvPr id="92" name="Google Shape;92;ge053b3de7a_0_11:notes"/>
-          <p:cNvSpPr txBox="1">
-            <a:spLocks noGrp="1"/>
-          </p:cNvSpPr>
-          <p:nvPr>
-            <p:ph type="body" idx="1"/>
-          </p:nvPr>
-        </p:nvSpPr>
-        <p:spPr>
-          <a:xfrm>
-            <a:off x="685800" y="4343400"/>
-            <a:ext cx="5486400" cy="4114800"/>
-          </a:xfrm>
-          <a:prstGeom prst="rect">
-            <a:avLst/>
-          </a:prstGeom>
-        </p:spPr>
-        <p:txBody>
-          <a:bodyPr spcFirstLastPara="1" wrap="square" lIns="91425" tIns="91425" rIns="91425" bIns="91425" anchor="t" anchorCtr="0">
-            <a:noAutofit/>
-          </a:bodyPr>
-          <a:lstStyle/>
-          <a:p>
-            <a:pPr marL="0" lvl="0" indent="0" algn="l" rtl="0">
-              <a:spcBef>
-                <a:spcPts val="0"/>
-              </a:spcBef>
-              <a:spcAft>
-                <a:spcPts val="0"/>
-              </a:spcAft>
-              <a:buNone/>
-            </a:pPr>
-            <a:endParaRPr/>
-          </a:p>
-        </p:txBody>
-      </p:sp>
-    </p:spTree>
-  </p:cSld>
-  <p:clrMapOvr>
-    <a:masterClrMapping/>
-  </p:clrMapOvr>
-</p:notes>
-</file>
-
-<file path=ppt/notesSlides/notesSlide12.xml><?xml version="1.0" encoding="utf-8"?>
 <p:notes xmlns:a="http://schemas.openxmlformats.org/drawingml/2006/main" xmlns:r="http://schemas.openxmlformats.org/officeDocument/2006/relationships" xmlns:p="http://schemas.openxmlformats.org/presentationml/2006/main" showMasterSp="0" showMasterPhAnim="0">
   <p:cSld>
     <p:spTree>
@@ -1138,7 +1033,7 @@
 </p:notes>
 </file>
 
-<file path=ppt/notesSlides/notesSlide13.xml><?xml version="1.0" encoding="utf-8"?>
+<file path=ppt/notesSlides/notesSlide12.xml><?xml version="1.0" encoding="utf-8"?>
 <p:notes xmlns:a="http://schemas.openxmlformats.org/drawingml/2006/main" xmlns:r="http://schemas.openxmlformats.org/officeDocument/2006/relationships" xmlns:p="http://schemas.openxmlformats.org/presentationml/2006/main" showMasterSp="0" showMasterPhAnim="0">
   <p:cSld>
     <p:spTree>
@@ -1242,7 +1137,7 @@
 </p:notes>
 </file>
 
-<file path=ppt/notesSlides/notesSlide14.xml><?xml version="1.0" encoding="utf-8"?>
+<file path=ppt/notesSlides/notesSlide13.xml><?xml version="1.0" encoding="utf-8"?>
 <p:notes xmlns:a="http://schemas.openxmlformats.org/drawingml/2006/main" xmlns:r="http://schemas.openxmlformats.org/officeDocument/2006/relationships" xmlns:p="http://schemas.openxmlformats.org/presentationml/2006/main" showMasterSp="0" showMasterPhAnim="0">
   <p:cSld>
     <p:spTree>
@@ -1346,7 +1241,7 @@
 </p:notes>
 </file>
 
-<file path=ppt/notesSlides/notesSlide15.xml><?xml version="1.0" encoding="utf-8"?>
+<file path=ppt/notesSlides/notesSlide14.xml><?xml version="1.0" encoding="utf-8"?>
 <p:notes xmlns:a="http://schemas.openxmlformats.org/drawingml/2006/main" xmlns:r="http://schemas.openxmlformats.org/officeDocument/2006/relationships" xmlns:p="http://schemas.openxmlformats.org/presentationml/2006/main" showMasterSp="0" showMasterPhAnim="0">
   <p:cSld>
     <p:spTree>
@@ -1450,7 +1345,7 @@
 </p:notes>
 </file>
 
-<file path=ppt/notesSlides/notesSlide16.xml><?xml version="1.0" encoding="utf-8"?>
+<file path=ppt/notesSlides/notesSlide15.xml><?xml version="1.0" encoding="utf-8"?>
 <p:notes xmlns:a="http://schemas.openxmlformats.org/drawingml/2006/main" xmlns:r="http://schemas.openxmlformats.org/officeDocument/2006/relationships" xmlns:p="http://schemas.openxmlformats.org/presentationml/2006/main" showMasterSp="0" showMasterPhAnim="0">
   <p:cSld>
     <p:spTree>
@@ -1554,7 +1449,7 @@
 </p:notes>
 </file>
 
-<file path=ppt/notesSlides/notesSlide17.xml><?xml version="1.0" encoding="utf-8"?>
+<file path=ppt/notesSlides/notesSlide16.xml><?xml version="1.0" encoding="utf-8"?>
 <p:notes xmlns:a="http://schemas.openxmlformats.org/drawingml/2006/main" xmlns:r="http://schemas.openxmlformats.org/officeDocument/2006/relationships" xmlns:p="http://schemas.openxmlformats.org/presentationml/2006/main" showMasterSp="0" showMasterPhAnim="0">
   <p:cSld>
     <p:spTree>
@@ -1658,7 +1553,7 @@
 </p:notes>
 </file>
 
-<file path=ppt/notesSlides/notesSlide18.xml><?xml version="1.0" encoding="utf-8"?>
+<file path=ppt/notesSlides/notesSlide17.xml><?xml version="1.0" encoding="utf-8"?>
 <p:notes xmlns:a="http://schemas.openxmlformats.org/drawingml/2006/main" xmlns:r="http://schemas.openxmlformats.org/officeDocument/2006/relationships" xmlns:p="http://schemas.openxmlformats.org/presentationml/2006/main" showMasterSp="0" showMasterPhAnim="0">
   <p:cSld>
     <p:spTree>
@@ -1762,7 +1657,7 @@
 </p:notes>
 </file>
 
-<file path=ppt/notesSlides/notesSlide19.xml><?xml version="1.0" encoding="utf-8"?>
+<file path=ppt/notesSlides/notesSlide18.xml><?xml version="1.0" encoding="utf-8"?>
 <p:notes xmlns:a="http://schemas.openxmlformats.org/drawingml/2006/main" xmlns:r="http://schemas.openxmlformats.org/officeDocument/2006/relationships" xmlns:p="http://schemas.openxmlformats.org/presentationml/2006/main" showMasterSp="0" showMasterPhAnim="0">
   <p:cSld>
     <p:spTree>
@@ -1854,6 +1749,114 @@
               </a:spcAft>
               <a:buNone/>
             </a:pPr>
+            <a:endParaRPr/>
+          </a:p>
+        </p:txBody>
+      </p:sp>
+    </p:spTree>
+  </p:cSld>
+  <p:clrMapOvr>
+    <a:masterClrMapping/>
+  </p:clrMapOvr>
+</p:notes>
+</file>
+
+<file path=ppt/notesSlides/notesSlide19.xml><?xml version="1.0" encoding="utf-8"?>
+<p:notes xmlns:a="http://schemas.openxmlformats.org/drawingml/2006/main" xmlns:r="http://schemas.openxmlformats.org/officeDocument/2006/relationships" xmlns:p="http://schemas.openxmlformats.org/presentationml/2006/main" showMasterSp="0" showMasterPhAnim="0">
+  <p:cSld>
+    <p:spTree>
+      <p:nvGrpSpPr>
+        <p:cNvPr id="1" name="Shape 155"/>
+        <p:cNvGrpSpPr/>
+        <p:nvPr/>
+      </p:nvGrpSpPr>
+      <p:grpSpPr>
+        <a:xfrm>
+          <a:off x="0" y="0"/>
+          <a:ext cx="0" cy="0"/>
+          <a:chOff x="0" y="0"/>
+          <a:chExt cx="0" cy="0"/>
+        </a:xfrm>
+      </p:grpSpPr>
+      <p:sp>
+        <p:nvSpPr>
+          <p:cNvPr id="156" name="Google Shape;156;gdfb86f3e77_4_0:notes"/>
+          <p:cNvSpPr>
+            <a:spLocks noGrp="1" noRot="1" noChangeAspect="1"/>
+          </p:cNvSpPr>
+          <p:nvPr>
+            <p:ph type="sldImg" idx="2"/>
+          </p:nvPr>
+        </p:nvSpPr>
+        <p:spPr>
+          <a:xfrm>
+            <a:off x="381300" y="685800"/>
+            <a:ext cx="6096000" cy="3429000"/>
+          </a:xfrm>
+          <a:custGeom>
+            <a:avLst/>
+            <a:gdLst/>
+            <a:ahLst/>
+            <a:cxnLst/>
+            <a:rect l="l" t="t" r="r" b="b"/>
+            <a:pathLst>
+              <a:path w="120000" h="120000" extrusionOk="0">
+                <a:moveTo>
+                  <a:pt x="0" y="0"/>
+                </a:moveTo>
+                <a:lnTo>
+                  <a:pt x="120000" y="0"/>
+                </a:lnTo>
+                <a:lnTo>
+                  <a:pt x="120000" y="120000"/>
+                </a:lnTo>
+                <a:lnTo>
+                  <a:pt x="0" y="120000"/>
+                </a:lnTo>
+                <a:close/>
+              </a:path>
+            </a:pathLst>
+          </a:custGeom>
+        </p:spPr>
+      </p:sp>
+      <p:sp>
+        <p:nvSpPr>
+          <p:cNvPr id="157" name="Google Shape;157;gdfb86f3e77_4_0:notes"/>
+          <p:cNvSpPr txBox="1">
+            <a:spLocks noGrp="1"/>
+          </p:cNvSpPr>
+          <p:nvPr>
+            <p:ph type="body" idx="1"/>
+          </p:nvPr>
+        </p:nvSpPr>
+        <p:spPr>
+          <a:xfrm>
+            <a:off x="685800" y="4343400"/>
+            <a:ext cx="5486400" cy="4114800"/>
+          </a:xfrm>
+          <a:prstGeom prst="rect">
+            <a:avLst/>
+          </a:prstGeom>
+        </p:spPr>
+        <p:txBody>
+          <a:bodyPr spcFirstLastPara="1" wrap="square" lIns="91425" tIns="91425" rIns="91425" bIns="91425" anchor="t" anchorCtr="0">
+            <a:noAutofit/>
+          </a:bodyPr>
+          <a:lstStyle/>
+          <a:p>
+            <a:pPr marL="0" lvl="0" indent="0" algn="l" rtl="0">
+              <a:spcBef>
+                <a:spcPts val="0"/>
+              </a:spcBef>
+              <a:spcAft>
+                <a:spcPts val="0"/>
+              </a:spcAft>
+              <a:buNone/>
+            </a:pPr>
+            <a:r>
+              <a:rPr lang="en"/>
+              <a:t>Pivot to show in website</a:t>
+            </a:r>
             <a:endParaRPr/>
           </a:p>
         </p:txBody>
@@ -1975,7 +1978,7 @@
   <p:cSld>
     <p:spTree>
       <p:nvGrpSpPr>
-        <p:cNvPr id="1" name="Shape 155"/>
+        <p:cNvPr id="1" name="Shape 161"/>
         <p:cNvGrpSpPr/>
         <p:nvPr/>
       </p:nvGrpSpPr>
@@ -1989,7 +1992,7 @@
       </p:grpSpPr>
       <p:sp>
         <p:nvSpPr>
-          <p:cNvPr id="156" name="Google Shape;156;gdfb86f3e77_4_0:notes"/>
+          <p:cNvPr id="162" name="Google Shape;162;gdee36292d2_1_96:notes"/>
           <p:cNvSpPr>
             <a:spLocks noGrp="1" noRot="1" noChangeAspect="1"/>
           </p:cNvSpPr>
@@ -2030,7 +2033,7 @@
       </p:sp>
       <p:sp>
         <p:nvSpPr>
-          <p:cNvPr id="157" name="Google Shape;157;gdfb86f3e77_4_0:notes"/>
+          <p:cNvPr id="163" name="Google Shape;163;gdee36292d2_1_96:notes"/>
           <p:cNvSpPr txBox="1">
             <a:spLocks noGrp="1"/>
           </p:cNvSpPr>
@@ -2062,10 +2065,6 @@
               </a:spcAft>
               <a:buNone/>
             </a:pPr>
-            <a:r>
-              <a:rPr lang="en"/>
-              <a:t>Pivot to show in website</a:t>
-            </a:r>
             <a:endParaRPr/>
           </a:p>
         </p:txBody>
@@ -2079,110 +2078,6 @@
 </file>
 
 <file path=ppt/notesSlides/notesSlide21.xml><?xml version="1.0" encoding="utf-8"?>
-<p:notes xmlns:a="http://schemas.openxmlformats.org/drawingml/2006/main" xmlns:r="http://schemas.openxmlformats.org/officeDocument/2006/relationships" xmlns:p="http://schemas.openxmlformats.org/presentationml/2006/main" showMasterSp="0" showMasterPhAnim="0">
-  <p:cSld>
-    <p:spTree>
-      <p:nvGrpSpPr>
-        <p:cNvPr id="1" name="Shape 161"/>
-        <p:cNvGrpSpPr/>
-        <p:nvPr/>
-      </p:nvGrpSpPr>
-      <p:grpSpPr>
-        <a:xfrm>
-          <a:off x="0" y="0"/>
-          <a:ext cx="0" cy="0"/>
-          <a:chOff x="0" y="0"/>
-          <a:chExt cx="0" cy="0"/>
-        </a:xfrm>
-      </p:grpSpPr>
-      <p:sp>
-        <p:nvSpPr>
-          <p:cNvPr id="162" name="Google Shape;162;gdee36292d2_1_96:notes"/>
-          <p:cNvSpPr>
-            <a:spLocks noGrp="1" noRot="1" noChangeAspect="1"/>
-          </p:cNvSpPr>
-          <p:nvPr>
-            <p:ph type="sldImg" idx="2"/>
-          </p:nvPr>
-        </p:nvSpPr>
-        <p:spPr>
-          <a:xfrm>
-            <a:off x="381300" y="685800"/>
-            <a:ext cx="6096000" cy="3429000"/>
-          </a:xfrm>
-          <a:custGeom>
-            <a:avLst/>
-            <a:gdLst/>
-            <a:ahLst/>
-            <a:cxnLst/>
-            <a:rect l="l" t="t" r="r" b="b"/>
-            <a:pathLst>
-              <a:path w="120000" h="120000" extrusionOk="0">
-                <a:moveTo>
-                  <a:pt x="0" y="0"/>
-                </a:moveTo>
-                <a:lnTo>
-                  <a:pt x="120000" y="0"/>
-                </a:lnTo>
-                <a:lnTo>
-                  <a:pt x="120000" y="120000"/>
-                </a:lnTo>
-                <a:lnTo>
-                  <a:pt x="0" y="120000"/>
-                </a:lnTo>
-                <a:close/>
-              </a:path>
-            </a:pathLst>
-          </a:custGeom>
-        </p:spPr>
-      </p:sp>
-      <p:sp>
-        <p:nvSpPr>
-          <p:cNvPr id="163" name="Google Shape;163;gdee36292d2_1_96:notes"/>
-          <p:cNvSpPr txBox="1">
-            <a:spLocks noGrp="1"/>
-          </p:cNvSpPr>
-          <p:nvPr>
-            <p:ph type="body" idx="1"/>
-          </p:nvPr>
-        </p:nvSpPr>
-        <p:spPr>
-          <a:xfrm>
-            <a:off x="685800" y="4343400"/>
-            <a:ext cx="5486400" cy="4114800"/>
-          </a:xfrm>
-          <a:prstGeom prst="rect">
-            <a:avLst/>
-          </a:prstGeom>
-        </p:spPr>
-        <p:txBody>
-          <a:bodyPr spcFirstLastPara="1" wrap="square" lIns="91425" tIns="91425" rIns="91425" bIns="91425" anchor="t" anchorCtr="0">
-            <a:noAutofit/>
-          </a:bodyPr>
-          <a:lstStyle/>
-          <a:p>
-            <a:pPr marL="0" lvl="0" indent="0" algn="l" rtl="0">
-              <a:spcBef>
-                <a:spcPts val="0"/>
-              </a:spcBef>
-              <a:spcAft>
-                <a:spcPts val="0"/>
-              </a:spcAft>
-              <a:buNone/>
-            </a:pPr>
-            <a:endParaRPr/>
-          </a:p>
-        </p:txBody>
-      </p:sp>
-    </p:spTree>
-  </p:cSld>
-  <p:clrMapOvr>
-    <a:masterClrMapping/>
-  </p:clrMapOvr>
-</p:notes>
-</file>
-
-<file path=ppt/notesSlides/notesSlide22.xml><?xml version="1.0" encoding="utf-8"?>
 <p:notes xmlns:a="http://schemas.openxmlformats.org/drawingml/2006/main" xmlns:r="http://schemas.openxmlformats.org/officeDocument/2006/relationships" xmlns:p="http://schemas.openxmlformats.org/presentationml/2006/main" showMasterSp="0" showMasterPhAnim="0">
   <p:cSld>
     <p:spTree>
@@ -2811,7 +2706,7 @@
   <p:cSld>
     <p:spTree>
       <p:nvGrpSpPr>
-        <p:cNvPr id="1" name="Shape 69"/>
+        <p:cNvPr id="1" name="Shape 76"/>
         <p:cNvGrpSpPr/>
         <p:nvPr/>
       </p:nvGrpSpPr>
@@ -2825,7 +2720,7 @@
       </p:grpSpPr>
       <p:sp>
         <p:nvSpPr>
-          <p:cNvPr id="70" name="Google Shape;70;ge053b3de7a_0_5:notes"/>
+          <p:cNvPr id="77" name="Google Shape;77;gdfc1f552a7_3_5:notes"/>
           <p:cNvSpPr>
             <a:spLocks noGrp="1" noRot="1" noChangeAspect="1"/>
           </p:cNvSpPr>
@@ -2866,7 +2761,7 @@
       </p:sp>
       <p:sp>
         <p:nvSpPr>
-          <p:cNvPr id="71" name="Google Shape;71;ge053b3de7a_0_5:notes"/>
+          <p:cNvPr id="78" name="Google Shape;78;gdfc1f552a7_3_5:notes"/>
           <p:cNvSpPr txBox="1">
             <a:spLocks noGrp="1"/>
           </p:cNvSpPr>
@@ -2915,7 +2810,7 @@
   <p:cSld>
     <p:spTree>
       <p:nvGrpSpPr>
-        <p:cNvPr id="1" name="Shape 76"/>
+        <p:cNvPr id="1" name="Shape 83"/>
         <p:cNvGrpSpPr/>
         <p:nvPr/>
       </p:nvGrpSpPr>
@@ -2929,7 +2824,7 @@
       </p:grpSpPr>
       <p:sp>
         <p:nvSpPr>
-          <p:cNvPr id="77" name="Google Shape;77;gdfc1f552a7_3_5:notes"/>
+          <p:cNvPr id="84" name="Google Shape;84;gdfc1f552a7_3_12:notes"/>
           <p:cNvSpPr>
             <a:spLocks noGrp="1" noRot="1" noChangeAspect="1"/>
           </p:cNvSpPr>
@@ -2970,7 +2865,7 @@
       </p:sp>
       <p:sp>
         <p:nvSpPr>
-          <p:cNvPr id="78" name="Google Shape;78;gdfc1f552a7_3_5:notes"/>
+          <p:cNvPr id="85" name="Google Shape;85;gdfc1f552a7_3_12:notes"/>
           <p:cNvSpPr txBox="1">
             <a:spLocks noGrp="1"/>
           </p:cNvSpPr>
@@ -6819,142 +6714,6 @@
   <p:cSld>
     <p:spTree>
       <p:nvGrpSpPr>
-        <p:cNvPr id="1" name="Shape 86"/>
-        <p:cNvGrpSpPr/>
-        <p:nvPr/>
-      </p:nvGrpSpPr>
-      <p:grpSpPr>
-        <a:xfrm>
-          <a:off x="0" y="0"/>
-          <a:ext cx="0" cy="0"/>
-          <a:chOff x="0" y="0"/>
-          <a:chExt cx="0" cy="0"/>
-        </a:xfrm>
-      </p:grpSpPr>
-      <p:sp>
-        <p:nvSpPr>
-          <p:cNvPr id="87" name="Google Shape;87;p13"/>
-          <p:cNvSpPr txBox="1">
-            <a:spLocks noGrp="1"/>
-          </p:cNvSpPr>
-          <p:nvPr>
-            <p:ph type="title"/>
-          </p:nvPr>
-        </p:nvSpPr>
-        <p:spPr>
-          <a:xfrm>
-            <a:off x="214725" y="205978"/>
-            <a:ext cx="8229600" cy="857400"/>
-          </a:xfrm>
-          <a:prstGeom prst="rect">
-            <a:avLst/>
-          </a:prstGeom>
-        </p:spPr>
-        <p:txBody>
-          <a:bodyPr spcFirstLastPara="1" wrap="square" lIns="91425" tIns="45700" rIns="91425" bIns="45700" anchor="ctr" anchorCtr="0">
-            <a:noAutofit/>
-          </a:bodyPr>
-          <a:lstStyle/>
-          <a:p>
-            <a:pPr marL="0" lvl="0" indent="0" algn="ctr" rtl="0">
-              <a:spcBef>
-                <a:spcPts val="0"/>
-              </a:spcBef>
-              <a:spcAft>
-                <a:spcPts val="0"/>
-              </a:spcAft>
-              <a:buNone/>
-            </a:pPr>
-            <a:r>
-              <a:rPr lang="en"/>
-              <a:t>Dataset Documentation</a:t>
-            </a:r>
-            <a:endParaRPr/>
-          </a:p>
-        </p:txBody>
-      </p:sp>
-      <p:sp>
-        <p:nvSpPr>
-          <p:cNvPr id="88" name="Google Shape;88;p13"/>
-          <p:cNvSpPr txBox="1">
-            <a:spLocks noGrp="1"/>
-          </p:cNvSpPr>
-          <p:nvPr>
-            <p:ph type="body" idx="1"/>
-          </p:nvPr>
-        </p:nvSpPr>
-        <p:spPr>
-          <a:xfrm>
-            <a:off x="457200" y="1200150"/>
-            <a:ext cx="8229600" cy="3394500"/>
-          </a:xfrm>
-          <a:prstGeom prst="rect">
-            <a:avLst/>
-          </a:prstGeom>
-        </p:spPr>
-        <p:txBody>
-          <a:bodyPr spcFirstLastPara="1" wrap="square" lIns="91425" tIns="45700" rIns="91425" bIns="45700" anchor="t" anchorCtr="0">
-            <a:noAutofit/>
-          </a:bodyPr>
-          <a:lstStyle/>
-          <a:p>
-            <a:pPr marL="0" lvl="0" indent="0" algn="l" rtl="0">
-              <a:lnSpc>
-                <a:spcPct val="200000"/>
-              </a:lnSpc>
-              <a:spcBef>
-                <a:spcPts val="360"/>
-              </a:spcBef>
-              <a:spcAft>
-                <a:spcPts val="0"/>
-              </a:spcAft>
-              <a:buNone/>
-            </a:pPr>
-            <a:endParaRPr sz="2000"/>
-          </a:p>
-        </p:txBody>
-      </p:sp>
-      <p:pic>
-        <p:nvPicPr>
-          <p:cNvPr id="89" name="Google Shape;89;p13"/>
-          <p:cNvPicPr preferRelativeResize="0"/>
-          <p:nvPr/>
-        </p:nvPicPr>
-        <p:blipFill>
-          <a:blip r:embed="rId3">
-            <a:alphaModFix/>
-          </a:blip>
-          <a:stretch>
-            <a:fillRect/>
-          </a:stretch>
-        </p:blipFill>
-        <p:spPr>
-          <a:xfrm>
-            <a:off x="2574325" y="1063375"/>
-            <a:ext cx="5103375" cy="3788875"/>
-          </a:xfrm>
-          <a:prstGeom prst="rect">
-            <a:avLst/>
-          </a:prstGeom>
-          <a:noFill/>
-          <a:ln>
-            <a:noFill/>
-          </a:ln>
-        </p:spPr>
-      </p:pic>
-    </p:spTree>
-  </p:cSld>
-  <p:clrMapOvr>
-    <a:masterClrMapping/>
-  </p:clrMapOvr>
-</p:sld>
-</file>
-
-<file path=ppt/slides/slide11.xml><?xml version="1.0" encoding="utf-8"?>
-<p:sld xmlns:a="http://schemas.openxmlformats.org/drawingml/2006/main" xmlns:r="http://schemas.openxmlformats.org/officeDocument/2006/relationships" xmlns:p="http://schemas.openxmlformats.org/presentationml/2006/main">
-  <p:cSld>
-    <p:spTree>
-      <p:nvGrpSpPr>
         <p:cNvPr id="1" name="Shape 93"/>
         <p:cNvGrpSpPr/>
         <p:nvPr/>
@@ -7045,7 +6804,7 @@
 </p:sld>
 </file>
 
-<file path=ppt/slides/slide12.xml><?xml version="1.0" encoding="utf-8"?>
+<file path=ppt/slides/slide11.xml><?xml version="1.0" encoding="utf-8"?>
 <p:sld xmlns:a="http://schemas.openxmlformats.org/drawingml/2006/main" xmlns:r="http://schemas.openxmlformats.org/officeDocument/2006/relationships" xmlns:p="http://schemas.openxmlformats.org/presentationml/2006/main">
   <p:cSld>
     <p:spTree>
@@ -7172,6 +6931,36 @@
           </a:prstGeom>
         </p:spPr>
       </p:pic>
+      <p:pic>
+        <p:nvPicPr>
+          <p:cNvPr id="2" name="Picture 1">
+            <a:extLst>
+              <a:ext uri="{FF2B5EF4-FFF2-40B4-BE49-F238E27FC236}">
+                <a16:creationId xmlns:a16="http://schemas.microsoft.com/office/drawing/2014/main" id="{EC0CAEE2-4688-45BB-A7B0-D205C56F3D51}"/>
+              </a:ext>
+            </a:extLst>
+          </p:cNvPr>
+          <p:cNvPicPr>
+            <a:picLocks noChangeAspect="1"/>
+          </p:cNvPicPr>
+          <p:nvPr/>
+        </p:nvPicPr>
+        <p:blipFill>
+          <a:blip r:embed="rId4"/>
+          <a:stretch>
+            <a:fillRect/>
+          </a:stretch>
+        </p:blipFill>
+        <p:spPr>
+          <a:xfrm>
+            <a:off x="7822407" y="4093369"/>
+            <a:ext cx="1321594" cy="1050131"/>
+          </a:xfrm>
+          <a:prstGeom prst="rect">
+            <a:avLst/>
+          </a:prstGeom>
+        </p:spPr>
+      </p:pic>
     </p:spTree>
   </p:cSld>
   <p:clrMapOvr>
@@ -7180,7 +6969,7 @@
 </p:sld>
 </file>
 
-<file path=ppt/slides/slide13.xml><?xml version="1.0" encoding="utf-8"?>
+<file path=ppt/slides/slide12.xml><?xml version="1.0" encoding="utf-8"?>
 <p:sld xmlns:a="http://schemas.openxmlformats.org/drawingml/2006/main" xmlns:r="http://schemas.openxmlformats.org/officeDocument/2006/relationships" xmlns:p="http://schemas.openxmlformats.org/presentationml/2006/main">
   <p:cSld>
     <p:spTree>
@@ -7315,7 +7104,7 @@
 </p:sld>
 </file>
 
-<file path=ppt/slides/slide14.xml><?xml version="1.0" encoding="utf-8"?>
+<file path=ppt/slides/slide13.xml><?xml version="1.0" encoding="utf-8"?>
 <p:sld xmlns:a="http://schemas.openxmlformats.org/drawingml/2006/main" xmlns:r="http://schemas.openxmlformats.org/officeDocument/2006/relationships" xmlns:p="http://schemas.openxmlformats.org/presentationml/2006/main">
   <p:cSld>
     <p:spTree>
@@ -7450,7 +7239,7 @@
 </p:sld>
 </file>
 
-<file path=ppt/slides/slide15.xml><?xml version="1.0" encoding="utf-8"?>
+<file path=ppt/slides/slide14.xml><?xml version="1.0" encoding="utf-8"?>
 <p:sld xmlns:a="http://schemas.openxmlformats.org/drawingml/2006/main" xmlns:r="http://schemas.openxmlformats.org/officeDocument/2006/relationships" xmlns:p="http://schemas.openxmlformats.org/presentationml/2006/main">
   <p:cSld>
     <p:spTree>
@@ -7517,7 +7306,7 @@
 </p:sld>
 </file>
 
-<file path=ppt/slides/slide16.xml><?xml version="1.0" encoding="utf-8"?>
+<file path=ppt/slides/slide15.xml><?xml version="1.0" encoding="utf-8"?>
 <p:sld xmlns:a="http://schemas.openxmlformats.org/drawingml/2006/main" xmlns:r="http://schemas.openxmlformats.org/officeDocument/2006/relationships" xmlns:p="http://schemas.openxmlformats.org/presentationml/2006/main">
   <p:cSld>
     <p:spTree>
@@ -7612,7 +7401,7 @@
 </p:sld>
 </file>
 
-<file path=ppt/slides/slide17.xml><?xml version="1.0" encoding="utf-8"?>
+<file path=ppt/slides/slide16.xml><?xml version="1.0" encoding="utf-8"?>
 <p:sld xmlns:a="http://schemas.openxmlformats.org/drawingml/2006/main" xmlns:r="http://schemas.openxmlformats.org/officeDocument/2006/relationships" xmlns:p="http://schemas.openxmlformats.org/presentationml/2006/main">
   <p:cSld>
     <p:spTree>
@@ -7745,7 +7534,7 @@
 </p:sld>
 </file>
 
-<file path=ppt/slides/slide18.xml><?xml version="1.0" encoding="utf-8"?>
+<file path=ppt/slides/slide17.xml><?xml version="1.0" encoding="utf-8"?>
 <p:sld xmlns:a="http://schemas.openxmlformats.org/drawingml/2006/main" xmlns:r="http://schemas.openxmlformats.org/officeDocument/2006/relationships" xmlns:p="http://schemas.openxmlformats.org/presentationml/2006/main">
   <p:cSld>
     <p:spTree>
@@ -7913,7 +7702,7 @@
 </p:sld>
 </file>
 
-<file path=ppt/slides/slide19.xml><?xml version="1.0" encoding="utf-8"?>
+<file path=ppt/slides/slide18.xml><?xml version="1.0" encoding="utf-8"?>
 <p:sld xmlns:a="http://schemas.openxmlformats.org/drawingml/2006/main" xmlns:r="http://schemas.openxmlformats.org/officeDocument/2006/relationships" xmlns:p="http://schemas.openxmlformats.org/presentationml/2006/main">
   <p:cSld>
     <p:spTree>
@@ -8055,6 +7844,116 @@
               <a:t>SVMs will not be able to perfectly separate classes.</a:t>
             </a:r>
             <a:endParaRPr sz="2000"/>
+          </a:p>
+        </p:txBody>
+      </p:sp>
+    </p:spTree>
+  </p:cSld>
+  <p:clrMapOvr>
+    <a:masterClrMapping/>
+  </p:clrMapOvr>
+</p:sld>
+</file>
+
+<file path=ppt/slides/slide19.xml><?xml version="1.0" encoding="utf-8"?>
+<p:sld xmlns:a="http://schemas.openxmlformats.org/drawingml/2006/main" xmlns:r="http://schemas.openxmlformats.org/officeDocument/2006/relationships" xmlns:p="http://schemas.openxmlformats.org/presentationml/2006/main">
+  <p:cSld>
+    <p:spTree>
+      <p:nvGrpSpPr>
+        <p:cNvPr id="1" name="Shape 158"/>
+        <p:cNvGrpSpPr/>
+        <p:nvPr/>
+      </p:nvGrpSpPr>
+      <p:grpSpPr>
+        <a:xfrm>
+          <a:off x="0" y="0"/>
+          <a:ext cx="0" cy="0"/>
+          <a:chOff x="0" y="0"/>
+          <a:chExt cx="0" cy="0"/>
+        </a:xfrm>
+      </p:grpSpPr>
+      <p:sp>
+        <p:nvSpPr>
+          <p:cNvPr id="159" name="Google Shape;159;p24"/>
+          <p:cNvSpPr txBox="1">
+            <a:spLocks noGrp="1"/>
+          </p:cNvSpPr>
+          <p:nvPr>
+            <p:ph type="title"/>
+          </p:nvPr>
+        </p:nvSpPr>
+        <p:spPr>
+          <a:xfrm>
+            <a:off x="457200" y="205978"/>
+            <a:ext cx="8229600" cy="857400"/>
+          </a:xfrm>
+          <a:prstGeom prst="rect">
+            <a:avLst/>
+          </a:prstGeom>
+        </p:spPr>
+        <p:txBody>
+          <a:bodyPr spcFirstLastPara="1" wrap="square" lIns="91425" tIns="45700" rIns="91425" bIns="45700" anchor="ctr" anchorCtr="0">
+            <a:noAutofit/>
+          </a:bodyPr>
+          <a:lstStyle/>
+          <a:p>
+            <a:pPr marL="0" lvl="0" indent="0" algn="ctr" rtl="0">
+              <a:spcBef>
+                <a:spcPts val="0"/>
+              </a:spcBef>
+              <a:spcAft>
+                <a:spcPts val="0"/>
+              </a:spcAft>
+              <a:buNone/>
+            </a:pPr>
+            <a:r>
+              <a:rPr lang="en"/>
+              <a:t>Mortality Rate Data from CDC</a:t>
+            </a:r>
+            <a:endParaRPr/>
+          </a:p>
+        </p:txBody>
+      </p:sp>
+      <p:sp>
+        <p:nvSpPr>
+          <p:cNvPr id="160" name="Google Shape;160;p24"/>
+          <p:cNvSpPr txBox="1">
+            <a:spLocks noGrp="1"/>
+          </p:cNvSpPr>
+          <p:nvPr>
+            <p:ph type="body" idx="1"/>
+          </p:nvPr>
+        </p:nvSpPr>
+        <p:spPr>
+          <a:xfrm>
+            <a:off x="457200" y="1200150"/>
+            <a:ext cx="8229600" cy="3394500"/>
+          </a:xfrm>
+          <a:prstGeom prst="rect">
+            <a:avLst/>
+          </a:prstGeom>
+        </p:spPr>
+        <p:txBody>
+          <a:bodyPr spcFirstLastPara="1" wrap="square" lIns="91425" tIns="45700" rIns="91425" bIns="45700" anchor="t" anchorCtr="0">
+            <a:noAutofit/>
+          </a:bodyPr>
+          <a:lstStyle/>
+          <a:p>
+            <a:pPr marL="457200" lvl="0" indent="-342900" algn="l" rtl="0">
+              <a:spcBef>
+                <a:spcPts val="360"/>
+              </a:spcBef>
+              <a:spcAft>
+                <a:spcPts val="0"/>
+              </a:spcAft>
+              <a:buSzPts val="1800"/>
+              <a:buChar char="•"/>
+            </a:pPr>
+            <a:r>
+              <a:rPr lang="en"/>
+              <a:t>In order to give our model a bit more context, and to test if our conclusions were correct, we pulled and visualized in Tableau heart disease mortality rate data from the CDC.</a:t>
+            </a:r>
+            <a:endParaRPr/>
           </a:p>
         </p:txBody>
       </p:sp>
@@ -8166,116 +8065,6 @@
   <p:cSld>
     <p:spTree>
       <p:nvGrpSpPr>
-        <p:cNvPr id="1" name="Shape 158"/>
-        <p:cNvGrpSpPr/>
-        <p:nvPr/>
-      </p:nvGrpSpPr>
-      <p:grpSpPr>
-        <a:xfrm>
-          <a:off x="0" y="0"/>
-          <a:ext cx="0" cy="0"/>
-          <a:chOff x="0" y="0"/>
-          <a:chExt cx="0" cy="0"/>
-        </a:xfrm>
-      </p:grpSpPr>
-      <p:sp>
-        <p:nvSpPr>
-          <p:cNvPr id="159" name="Google Shape;159;p24"/>
-          <p:cNvSpPr txBox="1">
-            <a:spLocks noGrp="1"/>
-          </p:cNvSpPr>
-          <p:nvPr>
-            <p:ph type="title"/>
-          </p:nvPr>
-        </p:nvSpPr>
-        <p:spPr>
-          <a:xfrm>
-            <a:off x="457200" y="205978"/>
-            <a:ext cx="8229600" cy="857400"/>
-          </a:xfrm>
-          <a:prstGeom prst="rect">
-            <a:avLst/>
-          </a:prstGeom>
-        </p:spPr>
-        <p:txBody>
-          <a:bodyPr spcFirstLastPara="1" wrap="square" lIns="91425" tIns="45700" rIns="91425" bIns="45700" anchor="ctr" anchorCtr="0">
-            <a:noAutofit/>
-          </a:bodyPr>
-          <a:lstStyle/>
-          <a:p>
-            <a:pPr marL="0" lvl="0" indent="0" algn="ctr" rtl="0">
-              <a:spcBef>
-                <a:spcPts val="0"/>
-              </a:spcBef>
-              <a:spcAft>
-                <a:spcPts val="0"/>
-              </a:spcAft>
-              <a:buNone/>
-            </a:pPr>
-            <a:r>
-              <a:rPr lang="en"/>
-              <a:t>Mortality Rate Data from CDC</a:t>
-            </a:r>
-            <a:endParaRPr/>
-          </a:p>
-        </p:txBody>
-      </p:sp>
-      <p:sp>
-        <p:nvSpPr>
-          <p:cNvPr id="160" name="Google Shape;160;p24"/>
-          <p:cNvSpPr txBox="1">
-            <a:spLocks noGrp="1"/>
-          </p:cNvSpPr>
-          <p:nvPr>
-            <p:ph type="body" idx="1"/>
-          </p:nvPr>
-        </p:nvSpPr>
-        <p:spPr>
-          <a:xfrm>
-            <a:off x="457200" y="1200150"/>
-            <a:ext cx="8229600" cy="3394500"/>
-          </a:xfrm>
-          <a:prstGeom prst="rect">
-            <a:avLst/>
-          </a:prstGeom>
-        </p:spPr>
-        <p:txBody>
-          <a:bodyPr spcFirstLastPara="1" wrap="square" lIns="91425" tIns="45700" rIns="91425" bIns="45700" anchor="t" anchorCtr="0">
-            <a:noAutofit/>
-          </a:bodyPr>
-          <a:lstStyle/>
-          <a:p>
-            <a:pPr marL="457200" lvl="0" indent="-342900" algn="l" rtl="0">
-              <a:spcBef>
-                <a:spcPts val="360"/>
-              </a:spcBef>
-              <a:spcAft>
-                <a:spcPts val="0"/>
-              </a:spcAft>
-              <a:buSzPts val="1800"/>
-              <a:buChar char="•"/>
-            </a:pPr>
-            <a:r>
-              <a:rPr lang="en"/>
-              <a:t>In order to give our model a bit more context, and to test if our conclusions were correct, we pulled and visualized in Tableau heart disease mortality rate data from the CDC.</a:t>
-            </a:r>
-            <a:endParaRPr/>
-          </a:p>
-        </p:txBody>
-      </p:sp>
-    </p:spTree>
-  </p:cSld>
-  <p:clrMapOvr>
-    <a:masterClrMapping/>
-  </p:clrMapOvr>
-</p:sld>
-</file>
-
-<file path=ppt/slides/slide21.xml><?xml version="1.0" encoding="utf-8"?>
-<p:sld xmlns:a="http://schemas.openxmlformats.org/drawingml/2006/main" xmlns:r="http://schemas.openxmlformats.org/officeDocument/2006/relationships" xmlns:p="http://schemas.openxmlformats.org/presentationml/2006/main">
-  <p:cSld>
-    <p:spTree>
-      <p:nvGrpSpPr>
         <p:cNvPr id="1" name="Shape 164"/>
         <p:cNvGrpSpPr/>
         <p:nvPr/>
@@ -8338,7 +8127,7 @@
 </p:sld>
 </file>
 
-<file path=ppt/slides/slide22.xml><?xml version="1.0" encoding="utf-8"?>
+<file path=ppt/slides/slide21.xml><?xml version="1.0" encoding="utf-8"?>
 <p:sld xmlns:a="http://schemas.openxmlformats.org/drawingml/2006/main" xmlns:r="http://schemas.openxmlformats.org/officeDocument/2006/relationships" xmlns:p="http://schemas.openxmlformats.org/presentationml/2006/main">
   <p:cSld>
     <p:spTree>
@@ -9287,199 +9076,6 @@
   <p:cSld>
     <p:spTree>
       <p:nvGrpSpPr>
-        <p:cNvPr id="1" name="Shape 72"/>
-        <p:cNvGrpSpPr/>
-        <p:nvPr/>
-      </p:nvGrpSpPr>
-      <p:grpSpPr>
-        <a:xfrm>
-          <a:off x="0" y="0"/>
-          <a:ext cx="0" cy="0"/>
-          <a:chOff x="0" y="0"/>
-          <a:chExt cx="0" cy="0"/>
-        </a:xfrm>
-      </p:grpSpPr>
-      <p:sp>
-        <p:nvSpPr>
-          <p:cNvPr id="73" name="Google Shape;73;p11"/>
-          <p:cNvSpPr txBox="1">
-            <a:spLocks noGrp="1"/>
-          </p:cNvSpPr>
-          <p:nvPr>
-            <p:ph type="title"/>
-          </p:nvPr>
-        </p:nvSpPr>
-        <p:spPr>
-          <a:xfrm>
-            <a:off x="457200" y="205978"/>
-            <a:ext cx="8229600" cy="857400"/>
-          </a:xfrm>
-          <a:prstGeom prst="rect">
-            <a:avLst/>
-          </a:prstGeom>
-        </p:spPr>
-        <p:txBody>
-          <a:bodyPr spcFirstLastPara="1" wrap="square" lIns="91425" tIns="45700" rIns="91425" bIns="45700" anchor="ctr" anchorCtr="0">
-            <a:noAutofit/>
-          </a:bodyPr>
-          <a:lstStyle/>
-          <a:p>
-            <a:pPr marL="0" lvl="0" indent="0" algn="ctr" rtl="0">
-              <a:spcBef>
-                <a:spcPts val="0"/>
-              </a:spcBef>
-              <a:spcAft>
-                <a:spcPts val="0"/>
-              </a:spcAft>
-              <a:buNone/>
-            </a:pPr>
-            <a:r>
-              <a:rPr lang="en"/>
-              <a:t>Import dataset</a:t>
-            </a:r>
-            <a:endParaRPr/>
-          </a:p>
-        </p:txBody>
-      </p:sp>
-      <p:sp>
-        <p:nvSpPr>
-          <p:cNvPr id="74" name="Google Shape;74;p11"/>
-          <p:cNvSpPr txBox="1">
-            <a:spLocks noGrp="1"/>
-          </p:cNvSpPr>
-          <p:nvPr>
-            <p:ph type="body" idx="1"/>
-          </p:nvPr>
-        </p:nvSpPr>
-        <p:spPr>
-          <a:xfrm>
-            <a:off x="457200" y="1200150"/>
-            <a:ext cx="8229600" cy="3394500"/>
-          </a:xfrm>
-          <a:prstGeom prst="rect">
-            <a:avLst/>
-          </a:prstGeom>
-        </p:spPr>
-        <p:txBody>
-          <a:bodyPr spcFirstLastPara="1" wrap="square" lIns="91425" tIns="45700" rIns="91425" bIns="45700" anchor="t" anchorCtr="0">
-            <a:noAutofit/>
-          </a:bodyPr>
-          <a:lstStyle/>
-          <a:p>
-            <a:pPr marL="457200" lvl="0" indent="-355600" algn="l" rtl="0">
-              <a:lnSpc>
-                <a:spcPct val="200000"/>
-              </a:lnSpc>
-              <a:spcBef>
-                <a:spcPts val="360"/>
-              </a:spcBef>
-              <a:spcAft>
-                <a:spcPts val="0"/>
-              </a:spcAft>
-              <a:buSzPts val="2000"/>
-              <a:buChar char="•"/>
-            </a:pPr>
-            <a:r>
-              <a:rPr lang="en" sz="2000"/>
-              <a:t>After downloading the data set and reading it in.</a:t>
-            </a:r>
-            <a:endParaRPr sz="2000"/>
-          </a:p>
-          <a:p>
-            <a:pPr marL="457200" lvl="0" indent="-355600" algn="l" rtl="0">
-              <a:lnSpc>
-                <a:spcPct val="200000"/>
-              </a:lnSpc>
-              <a:spcBef>
-                <a:spcPts val="0"/>
-              </a:spcBef>
-              <a:spcAft>
-                <a:spcPts val="0"/>
-              </a:spcAft>
-              <a:buSzPts val="2000"/>
-              <a:buChar char="•"/>
-            </a:pPr>
-            <a:r>
-              <a:rPr lang="en" sz="2000"/>
-              <a:t>There were 11 features and 1 target variable which was dropped</a:t>
-            </a:r>
-            <a:endParaRPr sz="2000"/>
-          </a:p>
-          <a:p>
-            <a:pPr marL="457200" lvl="0" indent="-355600" algn="l" rtl="0">
-              <a:lnSpc>
-                <a:spcPct val="200000"/>
-              </a:lnSpc>
-              <a:spcBef>
-                <a:spcPts val="0"/>
-              </a:spcBef>
-              <a:spcAft>
-                <a:spcPts val="0"/>
-              </a:spcAft>
-              <a:buSzPts val="2000"/>
-              <a:buChar char="•"/>
-            </a:pPr>
-            <a:r>
-              <a:rPr lang="en" sz="2000"/>
-              <a:t>Next, I described the data</a:t>
-            </a:r>
-            <a:endParaRPr sz="2000"/>
-          </a:p>
-          <a:p>
-            <a:pPr marL="457200" lvl="0" indent="0" algn="l" rtl="0">
-              <a:spcBef>
-                <a:spcPts val="360"/>
-              </a:spcBef>
-              <a:spcAft>
-                <a:spcPts val="0"/>
-              </a:spcAft>
-              <a:buNone/>
-            </a:pPr>
-            <a:endParaRPr sz="2000"/>
-          </a:p>
-        </p:txBody>
-      </p:sp>
-      <p:pic>
-        <p:nvPicPr>
-          <p:cNvPr id="75" name="Google Shape;75;p11"/>
-          <p:cNvPicPr preferRelativeResize="0"/>
-          <p:nvPr/>
-        </p:nvPicPr>
-        <p:blipFill>
-          <a:blip r:embed="rId3">
-            <a:alphaModFix/>
-          </a:blip>
-          <a:stretch>
-            <a:fillRect/>
-          </a:stretch>
-        </p:blipFill>
-        <p:spPr>
-          <a:xfrm>
-            <a:off x="0" y="2799844"/>
-            <a:ext cx="9144000" cy="2343661"/>
-          </a:xfrm>
-          <a:prstGeom prst="rect">
-            <a:avLst/>
-          </a:prstGeom>
-          <a:noFill/>
-          <a:ln>
-            <a:noFill/>
-          </a:ln>
-        </p:spPr>
-      </p:pic>
-    </p:spTree>
-  </p:cSld>
-  <p:clrMapOvr>
-    <a:masterClrMapping/>
-  </p:clrMapOvr>
-</p:sld>
-</file>
-
-<file path=ppt/slides/slide9.xml><?xml version="1.0" encoding="utf-8"?>
-<p:sld xmlns:a="http://schemas.openxmlformats.org/drawingml/2006/main" xmlns:r="http://schemas.openxmlformats.org/officeDocument/2006/relationships" xmlns:p="http://schemas.openxmlformats.org/presentationml/2006/main">
-  <p:cSld>
-    <p:spTree>
-      <p:nvGrpSpPr>
         <p:cNvPr id="1" name="Shape 79"/>
         <p:cNvGrpSpPr/>
         <p:nvPr/>
@@ -9592,6 +9188,142 @@
           <a:xfrm>
             <a:off x="457200" y="1063375"/>
             <a:ext cx="7758100" cy="3087350"/>
+          </a:xfrm>
+          <a:prstGeom prst="rect">
+            <a:avLst/>
+          </a:prstGeom>
+          <a:noFill/>
+          <a:ln>
+            <a:noFill/>
+          </a:ln>
+        </p:spPr>
+      </p:pic>
+    </p:spTree>
+  </p:cSld>
+  <p:clrMapOvr>
+    <a:masterClrMapping/>
+  </p:clrMapOvr>
+</p:sld>
+</file>
+
+<file path=ppt/slides/slide9.xml><?xml version="1.0" encoding="utf-8"?>
+<p:sld xmlns:a="http://schemas.openxmlformats.org/drawingml/2006/main" xmlns:r="http://schemas.openxmlformats.org/officeDocument/2006/relationships" xmlns:p="http://schemas.openxmlformats.org/presentationml/2006/main">
+  <p:cSld>
+    <p:spTree>
+      <p:nvGrpSpPr>
+        <p:cNvPr id="1" name="Shape 86"/>
+        <p:cNvGrpSpPr/>
+        <p:nvPr/>
+      </p:nvGrpSpPr>
+      <p:grpSpPr>
+        <a:xfrm>
+          <a:off x="0" y="0"/>
+          <a:ext cx="0" cy="0"/>
+          <a:chOff x="0" y="0"/>
+          <a:chExt cx="0" cy="0"/>
+        </a:xfrm>
+      </p:grpSpPr>
+      <p:sp>
+        <p:nvSpPr>
+          <p:cNvPr id="87" name="Google Shape;87;p13"/>
+          <p:cNvSpPr txBox="1">
+            <a:spLocks noGrp="1"/>
+          </p:cNvSpPr>
+          <p:nvPr>
+            <p:ph type="title"/>
+          </p:nvPr>
+        </p:nvSpPr>
+        <p:spPr>
+          <a:xfrm>
+            <a:off x="214725" y="205978"/>
+            <a:ext cx="8229600" cy="857400"/>
+          </a:xfrm>
+          <a:prstGeom prst="rect">
+            <a:avLst/>
+          </a:prstGeom>
+        </p:spPr>
+        <p:txBody>
+          <a:bodyPr spcFirstLastPara="1" wrap="square" lIns="91425" tIns="45700" rIns="91425" bIns="45700" anchor="ctr" anchorCtr="0">
+            <a:noAutofit/>
+          </a:bodyPr>
+          <a:lstStyle/>
+          <a:p>
+            <a:pPr marL="0" lvl="0" indent="0" algn="ctr" rtl="0">
+              <a:spcBef>
+                <a:spcPts val="0"/>
+              </a:spcBef>
+              <a:spcAft>
+                <a:spcPts val="0"/>
+              </a:spcAft>
+              <a:buNone/>
+            </a:pPr>
+            <a:r>
+              <a:rPr lang="en"/>
+              <a:t>Dataset Documentation</a:t>
+            </a:r>
+            <a:endParaRPr/>
+          </a:p>
+        </p:txBody>
+      </p:sp>
+      <p:sp>
+        <p:nvSpPr>
+          <p:cNvPr id="88" name="Google Shape;88;p13"/>
+          <p:cNvSpPr txBox="1">
+            <a:spLocks noGrp="1"/>
+          </p:cNvSpPr>
+          <p:nvPr>
+            <p:ph type="body" idx="1"/>
+          </p:nvPr>
+        </p:nvSpPr>
+        <p:spPr>
+          <a:xfrm>
+            <a:off x="457200" y="1200150"/>
+            <a:ext cx="8229600" cy="3394500"/>
+          </a:xfrm>
+          <a:prstGeom prst="rect">
+            <a:avLst/>
+          </a:prstGeom>
+        </p:spPr>
+        <p:txBody>
+          <a:bodyPr spcFirstLastPara="1" wrap="square" lIns="91425" tIns="45700" rIns="91425" bIns="45700" anchor="t" anchorCtr="0">
+            <a:noAutofit/>
+          </a:bodyPr>
+          <a:lstStyle/>
+          <a:p>
+            <a:pPr marL="0" lvl="0" indent="0" algn="l" rtl="0">
+              <a:lnSpc>
+                <a:spcPct val="200000"/>
+              </a:lnSpc>
+              <a:spcBef>
+                <a:spcPts val="360"/>
+              </a:spcBef>
+              <a:spcAft>
+                <a:spcPts val="0"/>
+              </a:spcAft>
+              <a:buNone/>
+            </a:pPr>
+            <a:endParaRPr sz="2000"/>
+          </a:p>
+        </p:txBody>
+      </p:sp>
+      <p:pic>
+        <p:nvPicPr>
+          <p:cNvPr id="89" name="Google Shape;89;p13"/>
+          <p:cNvPicPr preferRelativeResize="0"/>
+          <p:nvPr/>
+        </p:nvPicPr>
+        <p:blipFill>
+          <a:blip r:embed="rId3">
+            <a:alphaModFix/>
+          </a:blip>
+          <a:stretch>
+            <a:fillRect/>
+          </a:stretch>
+        </p:blipFill>
+        <p:spPr>
+          <a:xfrm>
+            <a:off x="2574325" y="1063375"/>
+            <a:ext cx="5103375" cy="3788875"/>
           </a:xfrm>
           <a:prstGeom prst="rect">
             <a:avLst/>

</xml_diff>